<commit_message>
add minimum cover lessin
</commit_message>
<xml_diff>
--- a/20277 Database systems/FunctionalDependencies_chapter8.pptx
+++ b/20277 Database systems/FunctionalDependencies_chapter8.pptx
@@ -3039,7 +3039,9 @@
         </p:nvSpPr>
         <p:spPr/>
         <p:txBody>
-          <a:bodyPr/>
+          <a:bodyPr>
+            <a:normAutofit lnSpcReduction="10000"/>
+          </a:bodyPr>
           <a:lstStyle/>
           <a:p>
             <a:r>
@@ -3050,19 +3052,20 @@
           <a:p>
             <a:r>
               <a:rPr lang="en-US" dirty="0"/>
-              <a:t>SQL Query</a:t>
-            </a:r>
-          </a:p>
-          <a:p>
-            <a:r>
-              <a:rPr lang="en-US" dirty="0"/>
-              <a:t>Install and run queries on </a:t>
-            </a:r>
-            <a:r>
-              <a:rPr lang="en-US" dirty="0" err="1"/>
-              <a:t>postgres</a:t>
-            </a:r>
-            <a:endParaRPr lang="en-US" dirty="0"/>
+              <a:t>Normalization, </a:t>
+            </a:r>
+          </a:p>
+          <a:p>
+            <a:r>
+              <a:rPr lang="en-US" dirty="0"/>
+              <a:t>minimum cover, functional dependencies</a:t>
+            </a:r>
+          </a:p>
+          <a:p>
+            <a:r>
+              <a:rPr lang="en-US" dirty="0"/>
+              <a:t> </a:t>
+            </a:r>
           </a:p>
         </p:txBody>
       </p:sp>
@@ -9207,7 +9210,19 @@
           <a:p>
             <a:r>
               <a:rPr lang="en-US" dirty="0"/>
-              <a:t>If A-&gt;B and A-&gt;C  then  A-&gt;BC	</a:t>
+              <a:t>If A-&gt;B and A-&gt;C  then  A-&gt;BC</a:t>
+            </a:r>
+          </a:p>
+          <a:p>
+            <a:r>
+              <a:rPr lang="en-US" dirty="0"/>
+              <a:t>We can deduct vise versa also:</a:t>
+            </a:r>
+          </a:p>
+          <a:p>
+            <a:r>
+              <a:rPr lang="en-US" dirty="0"/>
+              <a:t>If A-&gt;BC then A-&gt;B and A-&gt;C. this rule helps in minimum cover	</a:t>
             </a:r>
           </a:p>
         </p:txBody>
@@ -9285,6 +9300,28 @@
               <a:t>If A-&gt;BC  then A-&gt;B and A-&gt;C</a:t>
             </a:r>
           </a:p>
+          <a:p>
+            <a:pPr algn="r" rtl="1"/>
+            <a:r>
+              <a:rPr lang="he-IL" dirty="0"/>
+              <a:t>זה בדיוק מה שראינו קודם </a:t>
+            </a:r>
+          </a:p>
+          <a:p>
+            <a:pPr algn="r" rtl="1"/>
+            <a:r>
+              <a:rPr lang="he-IL" dirty="0"/>
+              <a:t>הכלל הזה הוא השלב הראשון במציאת כיסוי קנוני , </a:t>
+            </a:r>
+          </a:p>
+          <a:p>
+            <a:pPr algn="r" rtl="1"/>
+            <a:r>
+              <a:rPr lang="he-IL" dirty="0"/>
+              <a:t>במציאת כיסוי קנוני כל הצד הימני צריך להיות יחיד - סינגלטון</a:t>
+            </a:r>
+            <a:endParaRPr lang="en-US" dirty="0"/>
+          </a:p>
         </p:txBody>
       </p:sp>
     </p:spTree>
@@ -9334,7 +9371,9 @@
           </a:xfrm>
         </p:spPr>
         <p:txBody>
-          <a:bodyPr/>
+          <a:bodyPr>
+            <a:normAutofit/>
+          </a:bodyPr>
           <a:lstStyle/>
           <a:p>
             <a:pPr marL="0" indent="0" algn="r" rtl="1">
@@ -9375,6 +9414,75 @@
                 <a:cs typeface="David" panose="020E0502060401010101" pitchFamily="34" charset="-79"/>
               </a:rPr>
               <a:t>.</a:t>
+            </a:r>
+          </a:p>
+          <a:p>
+            <a:pPr marL="0" indent="0" algn="r" rtl="1">
+              <a:buNone/>
+            </a:pPr>
+            <a:r>
+              <a:rPr lang="he-IL" altLang="he-IL" dirty="0">
+                <a:latin typeface="Times New Roman (Hebrew)" charset="0"/>
+                <a:cs typeface="David" panose="020E0502060401010101" pitchFamily="34" charset="-79"/>
+              </a:rPr>
+              <a:t>למשל:</a:t>
+            </a:r>
+          </a:p>
+          <a:p>
+            <a:r>
+              <a:rPr lang="en-US" dirty="0"/>
+              <a:t>If A-&gt;F</a:t>
+            </a:r>
+          </a:p>
+          <a:p>
+            <a:r>
+              <a:rPr lang="en-US" dirty="0"/>
+              <a:t>And ABCDE-&gt;F</a:t>
+            </a:r>
+          </a:p>
+          <a:p>
+            <a:r>
+              <a:rPr lang="en-US" dirty="0"/>
+              <a:t>We can remove ABCDE-&gt;F  </a:t>
+            </a:r>
+          </a:p>
+          <a:p>
+            <a:pPr marL="0" indent="0" algn="r" rtl="1">
+              <a:buNone/>
+            </a:pPr>
+            <a:endParaRPr lang="he-IL" altLang="he-IL" dirty="0">
+              <a:latin typeface="Times New Roman (Hebrew)" charset="0"/>
+              <a:cs typeface="David" panose="020E0502060401010101" pitchFamily="34" charset="-79"/>
+            </a:endParaRPr>
+          </a:p>
+          <a:p>
+            <a:endParaRPr lang="he-IL" dirty="0"/>
+          </a:p>
+          <a:p>
+            <a:r>
+              <a:rPr lang="en-US" dirty="0"/>
+              <a:t>Using the closure, to find the redundant: </a:t>
+            </a:r>
+          </a:p>
+          <a:p>
+            <a:pPr marL="0" indent="0">
+              <a:buNone/>
+            </a:pPr>
+            <a:r>
+              <a:rPr lang="he-IL" dirty="0"/>
+              <a:t>  </a:t>
+            </a:r>
+            <a:r>
+              <a:rPr lang="en-US" dirty="0"/>
+              <a:t>A→C is redundant in {A→B, B→C, A→C} because A + = ABC w.r.t </a:t>
+            </a:r>
+            <a:r>
+              <a:rPr lang="he-IL" dirty="0"/>
+              <a:t> </a:t>
+            </a:r>
+            <a:r>
+              <a:rPr lang="en-US" dirty="0"/>
+              <a:t>{A→B, B→C}</a:t>
             </a:r>
           </a:p>
           <a:p>
@@ -9474,8 +9582,13 @@
             <a:pPr algn="r" rtl="1"/>
             <a:r>
               <a:rPr lang="he-IL" dirty="0"/>
-              <a:t>איבר יחיד בצד ימין</a:t>
-            </a:r>
+              <a:t>איבר יחיד בצד ימין – </a:t>
+            </a:r>
+            <a:r>
+              <a:rPr lang="en-US" dirty="0"/>
+              <a:t>singleton on the right hand side (RHS)</a:t>
+            </a:r>
+            <a:endParaRPr lang="he-IL" dirty="0"/>
           </a:p>
           <a:p>
             <a:pPr algn="r" rtl="1"/>
@@ -9483,6 +9596,19 @@
               <a:rPr lang="he-IL" dirty="0"/>
               <a:t>הוצאת איברים שאינם נחוצים</a:t>
             </a:r>
+            <a:r>
+              <a:rPr lang="en-US" dirty="0"/>
+              <a:t> - </a:t>
+            </a:r>
+            <a:r>
+              <a:rPr lang="he-IL" dirty="0"/>
+              <a:t> </a:t>
+            </a:r>
+            <a:r>
+              <a:rPr lang="en-US" dirty="0"/>
+              <a:t>Extraneous </a:t>
+            </a:r>
+            <a:endParaRPr lang="he-IL" dirty="0"/>
           </a:p>
           <a:p>
             <a:pPr algn="r" rtl="1"/>
@@ -9700,7 +9826,12 @@
             <p:ph idx="1"/>
           </p:nvPr>
         </p:nvSpPr>
-        <p:spPr/>
+        <p:spPr>
+          <a:xfrm>
+            <a:off x="838200" y="1825625"/>
+            <a:ext cx="10515600" cy="5274422"/>
+          </a:xfrm>
+        </p:spPr>
         <p:txBody>
           <a:bodyPr/>
           <a:lstStyle/>
@@ -9845,17 +9976,80 @@
               </a:buClr>
             </a:pPr>
             <a:r>
-              <a:rPr lang="en-US" altLang="en-US"/>
-              <a:t>ABECD</a:t>
-            </a:r>
-            <a:endParaRPr lang="en-US" altLang="en-US" dirty="0"/>
-          </a:p>
-          <a:p>
-            <a:pPr algn="r" rtl="1">
+              <a:rPr lang="en-US" altLang="en-US" dirty="0"/>
+              <a:t>A+= A ( transitivity rule)</a:t>
+            </a:r>
+          </a:p>
+          <a:p>
+            <a:pPr algn="l">
               <a:buClr>
                 <a:schemeClr val="tx1"/>
               </a:buClr>
             </a:pPr>
+            <a:r>
+              <a:rPr lang="en-US" altLang="en-US" dirty="0"/>
+              <a:t>A+=AB ( from A</a:t>
+            </a:r>
+            <a:r>
+              <a:rPr lang="en-US" altLang="en-US" dirty="0">
+                <a:sym typeface="Wingdings" panose="05000000000000000000" pitchFamily="2" charset="2"/>
+              </a:rPr>
+              <a:t>B)</a:t>
+            </a:r>
+          </a:p>
+          <a:p>
+            <a:pPr algn="l">
+              <a:buClr>
+                <a:schemeClr val="tx1"/>
+              </a:buClr>
+            </a:pPr>
+            <a:r>
+              <a:rPr lang="en-US" altLang="en-US" dirty="0">
+                <a:sym typeface="Wingdings" panose="05000000000000000000" pitchFamily="2" charset="2"/>
+              </a:rPr>
+              <a:t>A+= ABE ( E come from AE)</a:t>
+            </a:r>
+          </a:p>
+          <a:p>
+            <a:pPr algn="l">
+              <a:buClr>
+                <a:schemeClr val="tx1"/>
+              </a:buClr>
+            </a:pPr>
+            <a:r>
+              <a:rPr lang="en-US" altLang="en-US" dirty="0">
+                <a:sym typeface="Wingdings" panose="05000000000000000000" pitchFamily="2" charset="2"/>
+              </a:rPr>
+              <a:t>A+=ABEC ( from EC)</a:t>
+            </a:r>
+          </a:p>
+          <a:p>
+            <a:pPr algn="l">
+              <a:buClr>
+                <a:schemeClr val="tx1"/>
+              </a:buClr>
+            </a:pPr>
+            <a:r>
+              <a:rPr lang="en-US" altLang="en-US" dirty="0">
+                <a:sym typeface="Wingdings" panose="05000000000000000000" pitchFamily="2" charset="2"/>
+              </a:rPr>
+              <a:t>A+=</a:t>
+            </a:r>
+            <a:r>
+              <a:rPr lang="en-US" altLang="en-US" dirty="0">
+                <a:solidFill>
+                  <a:srgbClr val="FF0000"/>
+                </a:solidFill>
+                <a:sym typeface="Wingdings" panose="05000000000000000000" pitchFamily="2" charset="2"/>
+              </a:rPr>
+              <a:t>ABECD</a:t>
+            </a:r>
+            <a:r>
+              <a:rPr lang="en-US" altLang="en-US" dirty="0">
+                <a:sym typeface="Wingdings" panose="05000000000000000000" pitchFamily="2" charset="2"/>
+              </a:rPr>
+              <a:t> ( D come from BCD) </a:t>
+            </a:r>
             <a:endParaRPr lang="he-IL" altLang="en-US" dirty="0"/>
           </a:p>
         </p:txBody>
@@ -10352,7 +10546,7 @@
           <a:p>
             <a:r>
               <a:rPr lang="en-US" dirty="0"/>
-              <a:t>Computer the closure for relational schema R(A,B,C,D,E)</a:t>
+              <a:t>Compute the closure for relational schema R(A,B,C,D,E)</a:t>
             </a:r>
           </a:p>
           <a:p>
@@ -10393,10 +10587,16 @@
           <a:p>
             <a:pPr algn="r" rtl="1"/>
             <a:r>
+              <a:rPr lang="he-IL">
+                <a:sym typeface="Wingdings" panose="05000000000000000000" pitchFamily="2" charset="2"/>
+              </a:rPr>
+              <a:t>למציאת סגור של </a:t>
+            </a:r>
+            <a:r>
               <a:rPr lang="he-IL" dirty="0">
                 <a:sym typeface="Wingdings" panose="05000000000000000000" pitchFamily="2" charset="2"/>
               </a:rPr>
-              <a:t>למציאת של איבר יש אלגוריתם , שהוא פשוט קומבינציה של צד שמאל כל פעם שמוסיפים עוד איבר</a:t>
+              <a:t>איבר יש אלגוריתם , שהוא פשוט קומבינציה של צד שמאל כל פעם שמוסיפים עוד איבר</a:t>
             </a:r>
           </a:p>
           <a:p>

</xml_diff>